<commit_message>
added updated er diagram
</commit_message>
<xml_diff>
--- a/presentation.pptx
+++ b/presentation.pptx
@@ -6875,7 +6875,7 @@
       </p:sp>
       <p:pic>
         <p:nvPicPr>
-          <p:cNvPr id="7" name="Content Placeholder 6" descr="A diagram of a computer program">
+          <p:cNvPr id="7" name="Content Placeholder 6">
             <a:extLst>
               <a:ext uri="{FF2B5EF4-FFF2-40B4-BE49-F238E27FC236}">
                 <a16:creationId xmlns:a16="http://schemas.microsoft.com/office/drawing/2014/main" id="{AF3E5DD7-7928-81B2-3790-46F473F1E32B}"/>
@@ -6891,9 +6891,8 @@
         </p:nvPicPr>
         <p:blipFill>
           <a:blip r:embed="rId2"/>
-          <a:stretch>
-            <a:fillRect/>
-          </a:stretch>
+          <a:srcRect/>
+          <a:stretch/>
         </p:blipFill>
         <p:spPr>
           <a:xfrm>

</xml_diff>

<commit_message>
updated pptx with new er diagram
</commit_message>
<xml_diff>
--- a/presentation.pptx
+++ b/presentation.pptx
@@ -6875,7 +6875,7 @@
       </p:sp>
       <p:pic>
         <p:nvPicPr>
-          <p:cNvPr id="7" name="Content Placeholder 6" descr="A diagram of a computer program">
+          <p:cNvPr id="7" name="Content Placeholder 6">
             <a:extLst>
               <a:ext uri="{FF2B5EF4-FFF2-40B4-BE49-F238E27FC236}">
                 <a16:creationId xmlns:a16="http://schemas.microsoft.com/office/drawing/2014/main" id="{AF3E5DD7-7928-81B2-3790-46F473F1E32B}"/>
@@ -6891,9 +6891,8 @@
         </p:nvPicPr>
         <p:blipFill>
           <a:blip r:embed="rId2"/>
-          <a:stretch>
-            <a:fillRect/>
-          </a:stretch>
+          <a:srcRect/>
+          <a:stretch/>
         </p:blipFill>
         <p:spPr>
           <a:xfrm>

</xml_diff>